<commit_message>
add "coming up next" to last slide
</commit_message>
<xml_diff>
--- a/classes/prog2016/Prog3-Lecture13.pptx
+++ b/classes/prog2016/Prog3-Lecture13.pptx
@@ -50,6 +50,7 @@
     <p:sldId id="299" r:id="rId44"/>
     <p:sldId id="300" r:id="rId45"/>
     <p:sldId id="301" r:id="rId46"/>
+    <p:sldId id="302" r:id="rId47"/>
   </p:sldIdLst>
   <p:sldSz cx="12192000" cy="6858000"/>
   <p:notesSz cx="6858000" cy="9144000"/>
@@ -11608,6 +11609,79 @@
     <p:extLst>
       <p:ext uri="{BB962C8B-B14F-4D97-AF65-F5344CB8AC3E}">
         <p14:creationId xmlns:p14="http://schemas.microsoft.com/office/powerpoint/2010/main" val="3851618402"/>
+      </p:ext>
+    </p:extLst>
+  </p:cSld>
+  <p:clrMapOvr>
+    <a:masterClrMapping/>
+  </p:clrMapOvr>
+</p:sld>
+</file>
+
+<file path=ppt/slides/slide46.xml><?xml version="1.0" encoding="utf-8"?>
+<p:sld xmlns:a="http://schemas.openxmlformats.org/drawingml/2006/main" xmlns:r="http://schemas.openxmlformats.org/officeDocument/2006/relationships" xmlns:p="http://schemas.openxmlformats.org/presentationml/2006/main">
+  <p:cSld>
+    <p:spTree>
+      <p:nvGrpSpPr>
+        <p:cNvPr id="1" name=""/>
+        <p:cNvGrpSpPr/>
+        <p:nvPr/>
+      </p:nvGrpSpPr>
+      <p:grpSpPr>
+        <a:xfrm>
+          <a:off x="0" y="0"/>
+          <a:ext cx="0" cy="0"/>
+          <a:chOff x="0" y="0"/>
+          <a:chExt cx="0" cy="0"/>
+        </a:xfrm>
+      </p:grpSpPr>
+      <p:sp>
+        <p:nvSpPr>
+          <p:cNvPr id="2" name="TextBox 1"/>
+          <p:cNvSpPr txBox="1"/>
+          <p:nvPr/>
+        </p:nvSpPr>
+        <p:spPr>
+          <a:xfrm>
+            <a:off x="914400" y="764088"/>
+            <a:ext cx="7080785" cy="461665"/>
+          </a:xfrm>
+          <a:prstGeom prst="rect">
+            <a:avLst/>
+          </a:prstGeom>
+          <a:noFill/>
+        </p:spPr>
+        <p:txBody>
+          <a:bodyPr wrap="none" rtlCol="0">
+            <a:spAutoFit/>
+          </a:bodyPr>
+          <a:lstStyle/>
+          <a:p>
+            <a:r>
+              <a:rPr lang="en-US" sz="2400" dirty="0">
+                <a:latin typeface="Arial" panose="020B0604020202020204" pitchFamily="34" charset="0"/>
+                <a:cs typeface="Arial" panose="020B0604020202020204" pitchFamily="34" charset="0"/>
+              </a:rPr>
+              <a:t>Next:  Start reading the Concurrency in </a:t>
+            </a:r>
+            <a:r>
+              <a:rPr lang="en-US" sz="2400">
+                <a:latin typeface="Arial" panose="020B0604020202020204" pitchFamily="34" charset="0"/>
+                <a:cs typeface="Arial" panose="020B0604020202020204" pitchFamily="34" charset="0"/>
+              </a:rPr>
+              <a:t>Java book!</a:t>
+            </a:r>
+            <a:endParaRPr lang="en-US" sz="2400" dirty="0">
+              <a:latin typeface="Arial" panose="020B0604020202020204" pitchFamily="34" charset="0"/>
+              <a:cs typeface="Arial" panose="020B0604020202020204" pitchFamily="34" charset="0"/>
+            </a:endParaRPr>
+          </a:p>
+        </p:txBody>
+      </p:sp>
+    </p:spTree>
+    <p:extLst>
+      <p:ext uri="{BB962C8B-B14F-4D97-AF65-F5344CB8AC3E}">
+        <p14:creationId xmlns:p14="http://schemas.microsoft.com/office/powerpoint/2010/main" val="489311028"/>
       </p:ext>
     </p:extLst>
   </p:cSld>

</xml_diff>